<commit_message>
updated trial flyer for 2015/02/15.
</commit_message>
<xml_diff>
--- a/source/files/flyer_02_15_2015.pptx
+++ b/source/files/flyer_02_15_2015.pptx
@@ -11,7 +11,7 @@
     <p:sldId id="256" r:id="rId2"/>
   </p:sldIdLst>
   <p:sldSz cx="6858000" cy="9906000" type="A4"/>
-  <p:notesSz cx="6858000" cy="9872663"/>
+  <p:notesSz cx="6858000" cy="9945688"/>
   <p:defaultTextStyle>
     <a:defPPr>
       <a:defRPr lang="ja-JP"/>
@@ -181,7 +181,7 @@
         <p:spPr>
           <a:xfrm>
             <a:off x="0" y="0"/>
-            <a:ext cx="2971800" cy="495348"/>
+            <a:ext cx="2971800" cy="499012"/>
           </a:xfrm>
           <a:prstGeom prst="rect">
             <a:avLst/>
@@ -212,7 +212,7 @@
         <p:spPr>
           <a:xfrm>
             <a:off x="3884614" y="0"/>
-            <a:ext cx="2971800" cy="495348"/>
+            <a:ext cx="2971800" cy="499012"/>
           </a:xfrm>
           <a:prstGeom prst="rect">
             <a:avLst/>
@@ -246,8 +246,8 @@
         </p:nvSpPr>
         <p:spPr>
           <a:xfrm>
-            <a:off x="2274888" y="1233488"/>
-            <a:ext cx="2308225" cy="3332162"/>
+            <a:off x="2268538" y="1243013"/>
+            <a:ext cx="2320925" cy="3355975"/>
           </a:xfrm>
           <a:prstGeom prst="rect">
             <a:avLst/>
@@ -279,8 +279,8 @@
         </p:nvSpPr>
         <p:spPr>
           <a:xfrm>
-            <a:off x="685800" y="4751219"/>
-            <a:ext cx="5486400" cy="3887361"/>
+            <a:off x="685800" y="4786363"/>
+            <a:ext cx="5486400" cy="3916115"/>
           </a:xfrm>
           <a:prstGeom prst="rect">
             <a:avLst/>
@@ -371,8 +371,8 @@
         </p:nvSpPr>
         <p:spPr>
           <a:xfrm>
-            <a:off x="0" y="9377318"/>
-            <a:ext cx="2971800" cy="495347"/>
+            <a:off x="0" y="9446680"/>
+            <a:ext cx="2971800" cy="499011"/>
           </a:xfrm>
           <a:prstGeom prst="rect">
             <a:avLst/>
@@ -402,8 +402,8 @@
         </p:nvSpPr>
         <p:spPr>
           <a:xfrm>
-            <a:off x="3884614" y="9377318"/>
-            <a:ext cx="2971800" cy="495347"/>
+            <a:off x="3884614" y="9446680"/>
+            <a:ext cx="2971800" cy="499011"/>
           </a:xfrm>
           <a:prstGeom prst="rect">
             <a:avLst/>
@@ -4609,8 +4609,8 @@
           </a:prstGeom>
         </p:spPr>
         <p:txBody>
-          <a:bodyPr numCol="2" spcCol="360000">
-            <a:normAutofit/>
+          <a:bodyPr numCol="3" spcCol="180000">
+            <a:noAutofit/>
           </a:bodyPr>
           <a:lstStyle>
             <a:lvl1pPr marL="171450" indent="-171450" algn="l" defTabSz="685800" rtl="0" eaLnBrk="1" latinLnBrk="0" hangingPunct="1">
@@ -4788,21 +4788,28 @@
               <a:buNone/>
             </a:pPr>
             <a:r>
-              <a:rPr lang="ja-JP" altLang="en-US" sz="700" u="sng" dirty="0" smtClean="0">
+              <a:rPr lang="ja-JP" altLang="en-US" sz="800" dirty="0">
+                <a:latin typeface="+mj-ea"/>
+                <a:ea typeface="+mj-ea"/>
+              </a:rPr>
+              <a:t>📌</a:t>
+            </a:r>
+            <a:r>
+              <a:rPr lang="ja-JP" altLang="en-US" sz="800" b="1" dirty="0" smtClean="0">
                 <a:latin typeface="+mj-ea"/>
                 <a:ea typeface="+mj-ea"/>
               </a:rPr>
               <a:t>話題の</a:t>
             </a:r>
             <a:r>
-              <a:rPr lang="en-US" altLang="ja-JP" sz="700" u="sng" dirty="0" smtClean="0">
+              <a:rPr lang="en-US" altLang="ja-JP" sz="800" b="1" dirty="0" smtClean="0">
                 <a:latin typeface="+mj-ea"/>
                 <a:ea typeface="+mj-ea"/>
               </a:rPr>
               <a:t>Ruby</a:t>
             </a:r>
             <a:r>
-              <a:rPr lang="ja-JP" altLang="en-US" sz="700" u="sng" dirty="0" smtClean="0">
+              <a:rPr lang="ja-JP" altLang="en-US" sz="800" b="1" dirty="0" smtClean="0">
                 <a:latin typeface="+mj-ea"/>
                 <a:ea typeface="+mj-ea"/>
               </a:rPr>
@@ -4821,15 +4828,15 @@
               <a:buNone/>
             </a:pPr>
             <a:r>
-              <a:rPr lang="ja-JP" altLang="en-US" sz="500" dirty="0" smtClean="0"/>
+              <a:rPr lang="ja-JP" altLang="en-US" sz="700" dirty="0" smtClean="0"/>
               <a:t>松江市周辺にお住まいの方であれば「</a:t>
             </a:r>
             <a:r>
-              <a:rPr lang="en-US" altLang="ja-JP" sz="500" dirty="0" smtClean="0"/>
+              <a:rPr lang="en-US" altLang="ja-JP" sz="700" dirty="0" smtClean="0"/>
               <a:t>Ruby</a:t>
             </a:r>
             <a:r>
-              <a:rPr lang="ja-JP" altLang="en-US" sz="500" dirty="0" smtClean="0"/>
+              <a:rPr lang="ja-JP" altLang="en-US" sz="700" dirty="0" smtClean="0"/>
               <a:t>」という言葉を聞いたことがある方は多いのではないでしょうか。</a:t>
             </a:r>
           </a:p>
@@ -4845,67 +4852,67 @@
               <a:buNone/>
             </a:pPr>
             <a:r>
-              <a:rPr lang="ja-JP" altLang="en-US" sz="500" dirty="0" smtClean="0"/>
+              <a:rPr lang="ja-JP" altLang="en-US" sz="700" dirty="0" smtClean="0"/>
               <a:t>みなさんの</a:t>
             </a:r>
             <a:r>
-              <a:rPr lang="en-US" altLang="ja-JP" sz="500" dirty="0" smtClean="0"/>
+              <a:rPr lang="en-US" altLang="ja-JP" sz="700" dirty="0" smtClean="0"/>
               <a:t>Ruby</a:t>
             </a:r>
             <a:r>
-              <a:rPr lang="ja-JP" altLang="en-US" sz="500" dirty="0" smtClean="0"/>
+              <a:rPr lang="ja-JP" altLang="en-US" sz="700" dirty="0" smtClean="0"/>
               <a:t>のイメージは、</a:t>
             </a:r>
             <a:r>
-              <a:rPr lang="en-US" altLang="ja-JP" sz="500" dirty="0" smtClean="0"/>
+              <a:rPr lang="en-US" altLang="ja-JP" sz="700" dirty="0" smtClean="0"/>
               <a:t/>
             </a:r>
             <a:br>
-              <a:rPr lang="en-US" altLang="ja-JP" sz="500" dirty="0" smtClean="0"/>
+              <a:rPr lang="en-US" altLang="ja-JP" sz="700" dirty="0" smtClean="0"/>
             </a:br>
             <a:r>
-              <a:rPr lang="ja-JP" altLang="en-US" sz="500" dirty="0" smtClean="0"/>
+              <a:rPr lang="ja-JP" altLang="en-US" sz="700" dirty="0" smtClean="0"/>
               <a:t>　・宝石の</a:t>
             </a:r>
             <a:r>
-              <a:rPr lang="en-US" altLang="ja-JP" sz="500" dirty="0" smtClean="0"/>
+              <a:rPr lang="en-US" altLang="ja-JP" sz="700" dirty="0" smtClean="0"/>
               <a:t>Ruby</a:t>
             </a:r>
             <a:r>
-              <a:rPr lang="ja-JP" altLang="en-US" sz="500" dirty="0" smtClean="0"/>
+              <a:rPr lang="ja-JP" altLang="en-US" sz="700" dirty="0" smtClean="0"/>
               <a:t>とは違う</a:t>
             </a:r>
             <a:r>
-              <a:rPr lang="en-US" altLang="ja-JP" sz="500" dirty="0" smtClean="0"/>
+              <a:rPr lang="en-US" altLang="ja-JP" sz="700" dirty="0" smtClean="0"/>
               <a:t/>
             </a:r>
             <a:br>
-              <a:rPr lang="en-US" altLang="ja-JP" sz="500" dirty="0" smtClean="0"/>
+              <a:rPr lang="en-US" altLang="ja-JP" sz="700" dirty="0" smtClean="0"/>
             </a:br>
             <a:r>
-              <a:rPr lang="ja-JP" altLang="en-US" sz="500" dirty="0" smtClean="0"/>
+              <a:rPr lang="ja-JP" altLang="en-US" sz="700" dirty="0" smtClean="0"/>
               <a:t>　・コンピュータに関係あるもの</a:t>
             </a:r>
             <a:r>
-              <a:rPr lang="en-US" altLang="ja-JP" sz="500" dirty="0" smtClean="0"/>
+              <a:rPr lang="en-US" altLang="ja-JP" sz="700" dirty="0" smtClean="0"/>
               <a:t/>
             </a:r>
             <a:br>
-              <a:rPr lang="en-US" altLang="ja-JP" sz="500" dirty="0" smtClean="0"/>
+              <a:rPr lang="en-US" altLang="ja-JP" sz="700" dirty="0" smtClean="0"/>
             </a:br>
             <a:r>
-              <a:rPr lang="ja-JP" altLang="en-US" sz="500" dirty="0" smtClean="0"/>
+              <a:rPr lang="ja-JP" altLang="en-US" sz="700" dirty="0" smtClean="0"/>
               <a:t>　・松江市に在住のまつもとさんが作ったらしい</a:t>
             </a:r>
             <a:r>
-              <a:rPr lang="en-US" altLang="ja-JP" sz="500" dirty="0" smtClean="0"/>
+              <a:rPr lang="en-US" altLang="ja-JP" sz="700" dirty="0" smtClean="0"/>
               <a:t/>
             </a:r>
             <a:br>
-              <a:rPr lang="en-US" altLang="ja-JP" sz="500" dirty="0" smtClean="0"/>
+              <a:rPr lang="en-US" altLang="ja-JP" sz="700" dirty="0" smtClean="0"/>
             </a:br>
             <a:r>
-              <a:rPr lang="ja-JP" altLang="en-US" sz="500" dirty="0" smtClean="0"/>
+              <a:rPr lang="ja-JP" altLang="en-US" sz="700" dirty="0" smtClean="0"/>
               <a:t>といったところでしょうかね。</a:t>
             </a:r>
           </a:p>
@@ -4921,26 +4928,26 @@
               <a:buNone/>
             </a:pPr>
             <a:r>
-              <a:rPr lang="ja-JP" altLang="en-US" sz="500" dirty="0" smtClean="0"/>
+              <a:rPr lang="ja-JP" altLang="en-US" sz="700" dirty="0" smtClean="0"/>
               <a:t>そんな</a:t>
             </a:r>
             <a:r>
-              <a:rPr lang="en-US" altLang="ja-JP" sz="500" dirty="0" smtClean="0"/>
+              <a:rPr lang="en-US" altLang="ja-JP" sz="700" dirty="0" smtClean="0"/>
               <a:t>Ruby</a:t>
             </a:r>
             <a:r>
-              <a:rPr lang="ja-JP" altLang="en-US" sz="500" dirty="0" smtClean="0"/>
+              <a:rPr lang="ja-JP" altLang="en-US" sz="700" dirty="0" smtClean="0"/>
               <a:t>を親子で体験して、感じて、本当の意味で</a:t>
             </a:r>
             <a:r>
-              <a:rPr lang="en-US" altLang="ja-JP" sz="500" dirty="0" smtClean="0"/>
+              <a:rPr lang="en-US" altLang="ja-JP" sz="700" dirty="0" smtClean="0"/>
               <a:t>Ruby</a:t>
             </a:r>
             <a:r>
-              <a:rPr lang="ja-JP" altLang="en-US" sz="500" dirty="0" smtClean="0"/>
+              <a:rPr lang="ja-JP" altLang="en-US" sz="700" dirty="0" smtClean="0"/>
               <a:t>を理解してみませんか？</a:t>
             </a:r>
-            <a:endParaRPr lang="en-US" altLang="ja-JP" sz="500" dirty="0" smtClean="0"/>
+            <a:endParaRPr lang="en-US" altLang="ja-JP" sz="700" dirty="0" smtClean="0"/>
           </a:p>
           <a:p>
             <a:pPr marL="0" indent="0">
@@ -4953,11 +4960,29 @@
               <a:buFont typeface="Arial" panose="020B0604020202020204" pitchFamily="34" charset="0"/>
               <a:buNone/>
             </a:pPr>
-            <a:r>
-              <a:rPr lang="ja-JP" altLang="en-US" sz="700" u="sng" dirty="0" smtClean="0"/>
+            <a:endParaRPr lang="en-US" altLang="ja-JP" sz="600" dirty="0" smtClean="0"/>
+          </a:p>
+          <a:p>
+            <a:pPr marL="0" indent="0">
+              <a:lnSpc>
+                <a:spcPct val="150000"/>
+              </a:lnSpc>
+              <a:spcBef>
+                <a:spcPts val="0"/>
+              </a:spcBef>
+              <a:buNone/>
+            </a:pPr>
+            <a:r>
+              <a:rPr lang="ja-JP" altLang="en-US" sz="800" dirty="0">
+                <a:latin typeface="+mj-ea"/>
+              </a:rPr>
+              <a:t>📌</a:t>
+            </a:r>
+            <a:r>
+              <a:rPr lang="ja-JP" altLang="en-US" sz="800" b="1" dirty="0" smtClean="0"/>
               <a:t>内容</a:t>
             </a:r>
-            <a:endParaRPr lang="ja-JP" altLang="en-US" sz="500" u="sng" dirty="0" smtClean="0"/>
+            <a:endParaRPr lang="ja-JP" altLang="en-US" sz="600" b="1" dirty="0" smtClean="0"/>
           </a:p>
           <a:p>
             <a:pPr marL="0" indent="0">
@@ -4971,97 +4996,18 @@
               <a:buNone/>
             </a:pPr>
             <a:r>
-              <a:rPr lang="ja-JP" altLang="en-US" sz="500" dirty="0" smtClean="0"/>
-              <a:t>日時：毎月第３日曜日～しまね家庭の日～</a:t>
-            </a:r>
-            <a:r>
-              <a:rPr lang="ja-JP" altLang="en-US" sz="500" dirty="0"/>
-              <a:t>　</a:t>
-            </a:r>
-            <a:r>
-              <a:rPr lang="ja-JP" altLang="en-US" sz="500" dirty="0" smtClean="0"/>
-              <a:t>１４：００～１６：００</a:t>
-            </a:r>
-            <a:r>
-              <a:rPr lang="ja-JP" altLang="en-US" sz="500" dirty="0"/>
-              <a:t>　</a:t>
-            </a:r>
-            <a:r>
-              <a:rPr lang="ja-JP" altLang="en-US" sz="500" dirty="0" smtClean="0"/>
-              <a:t>（開場：１３：３０）</a:t>
-            </a:r>
-            <a:r>
-              <a:rPr lang="en-US" altLang="ja-JP" sz="500" dirty="0" smtClean="0"/>
-              <a:t/>
-            </a:r>
-            <a:br>
-              <a:rPr lang="en-US" altLang="ja-JP" sz="500" dirty="0" smtClean="0"/>
-            </a:br>
-            <a:r>
-              <a:rPr lang="ja-JP" altLang="en-US" sz="500" dirty="0" smtClean="0"/>
-              <a:t>場所：島根県松江市周辺の公民館など</a:t>
-            </a:r>
-            <a:r>
-              <a:rPr lang="en-US" altLang="ja-JP" sz="500" dirty="0" smtClean="0"/>
-              <a:t/>
-            </a:r>
-            <a:br>
-              <a:rPr lang="en-US" altLang="ja-JP" sz="500" dirty="0" smtClean="0"/>
-            </a:br>
-            <a:r>
-              <a:rPr lang="ja-JP" altLang="en-US" sz="500" dirty="0" smtClean="0"/>
-              <a:t>主催：Ｒｕｂｙプログラミング少年団</a:t>
-            </a:r>
-            <a:r>
-              <a:rPr lang="en-US" altLang="ja-JP" sz="500" dirty="0" smtClean="0"/>
-              <a:t/>
-            </a:r>
-            <a:br>
-              <a:rPr lang="en-US" altLang="ja-JP" sz="500" dirty="0" smtClean="0"/>
-            </a:br>
-            <a:r>
-              <a:rPr lang="ja-JP" altLang="en-US" sz="500" dirty="0" smtClean="0"/>
-              <a:t>料金：１家族２，０００円、１家族あたりのお子さんは２名まで（会場費・駐車場費用・機器レンタル料など実費相当）</a:t>
-            </a:r>
-            <a:r>
-              <a:rPr lang="en-US" altLang="ja-JP" sz="500" dirty="0" smtClean="0"/>
-              <a:t/>
-            </a:r>
-            <a:br>
-              <a:rPr lang="en-US" altLang="ja-JP" sz="500" dirty="0" smtClean="0"/>
-            </a:br>
-            <a:r>
-              <a:rPr lang="ja-JP" altLang="en-US" sz="500" dirty="0" smtClean="0"/>
-              <a:t>参加条件：小学校３年生～６年生までのお子さんを含むご家族</a:t>
-            </a:r>
-            <a:r>
-              <a:rPr lang="ja-JP" altLang="en-US" sz="500" dirty="0"/>
-              <a:t>、</a:t>
-            </a:r>
-            <a:r>
-              <a:rPr lang="ja-JP" altLang="en-US" sz="500" dirty="0" smtClean="0"/>
-              <a:t>かならず保護者もご参加ください</a:t>
-            </a:r>
-            <a:r>
-              <a:rPr lang="en-US" altLang="ja-JP" sz="500" dirty="0" smtClean="0"/>
-              <a:t/>
-            </a:r>
-            <a:br>
-              <a:rPr lang="en-US" altLang="ja-JP" sz="500" dirty="0" smtClean="0"/>
-            </a:br>
-            <a:r>
-              <a:rPr lang="ja-JP" altLang="en-US" sz="500" dirty="0" smtClean="0"/>
-              <a:t>連絡先：メール（</a:t>
-            </a:r>
-            <a:r>
-              <a:rPr lang="en-US" altLang="ja-JP" sz="500" dirty="0" smtClean="0"/>
-              <a:t>takaokouji@ezweb.ne.jp</a:t>
-            </a:r>
-            <a:r>
-              <a:rPr lang="ja-JP" altLang="en-US" sz="500" dirty="0" smtClean="0"/>
-              <a:t>）、電話（０９０－７５９３－４３２５　高尾）</a:t>
-            </a:r>
-            <a:endParaRPr lang="en-US" altLang="ja-JP" sz="500" dirty="0" smtClean="0"/>
+              <a:rPr lang="ja-JP" altLang="en-US" sz="700" dirty="0" smtClean="0"/>
+              <a:t>このイベントでは、こちらで用意したコンピュータを使って、「</a:t>
+            </a:r>
+            <a:r>
+              <a:rPr lang="en-US" altLang="ja-JP" sz="700" dirty="0" smtClean="0"/>
+              <a:t>Ruby</a:t>
+            </a:r>
+            <a:r>
+              <a:rPr lang="ja-JP" altLang="en-US" sz="700" dirty="0" smtClean="0"/>
+              <a:t>」を操作してコンピュータのソフトウェアを作ること（プログラミング）を体験してもらいます。お子さんだけでなく、保護者の方にもコンピュータを用意しています。</a:t>
+            </a:r>
+            <a:endParaRPr lang="en-US" altLang="ja-JP" sz="700" dirty="0" smtClean="0"/>
           </a:p>
           <a:p>
             <a:pPr marL="0" indent="0">
@@ -5074,7 +5020,19 @@
               <a:buFont typeface="Arial" panose="020B0604020202020204" pitchFamily="34" charset="0"/>
               <a:buNone/>
             </a:pPr>
-            <a:endParaRPr lang="en-US" altLang="ja-JP" sz="500" dirty="0" smtClean="0"/>
+            <a:r>
+              <a:rPr lang="ja-JP" altLang="en-US" sz="700" dirty="0" smtClean="0"/>
+              <a:t>初めての方や、コンピュータが苦手な方でも安心してください。マウスの操作だけで簡単なゲームを作ります。それを通じて、コンピュータのソフトウェアの作り方や、「</a:t>
+            </a:r>
+            <a:r>
+              <a:rPr lang="en-US" altLang="ja-JP" sz="700" dirty="0" smtClean="0"/>
+              <a:t>Ruby</a:t>
+            </a:r>
+            <a:r>
+              <a:rPr lang="ja-JP" altLang="en-US" sz="700" dirty="0" smtClean="0"/>
+              <a:t>」とはどういったものなのかを知っていただきます。</a:t>
+            </a:r>
+            <a:endParaRPr lang="en-US" altLang="ja-JP" sz="700" dirty="0" smtClean="0"/>
           </a:p>
           <a:p>
             <a:pPr marL="0" indent="0">
@@ -5087,19 +5045,7 @@
               <a:buFont typeface="Arial" panose="020B0604020202020204" pitchFamily="34" charset="0"/>
               <a:buNone/>
             </a:pPr>
-            <a:r>
-              <a:rPr lang="ja-JP" altLang="en-US" sz="500" dirty="0" smtClean="0"/>
-              <a:t>このイベントでは、こちらで用意したコンピュータを使って、「</a:t>
-            </a:r>
-            <a:r>
-              <a:rPr lang="en-US" altLang="ja-JP" sz="500" dirty="0" smtClean="0"/>
-              <a:t>Ruby</a:t>
-            </a:r>
-            <a:r>
-              <a:rPr lang="ja-JP" altLang="en-US" sz="500" dirty="0" smtClean="0"/>
-              <a:t>」を操作してコンピュータのソフトウェアを作ること（プログラミング）を体験してもらいます。お子さんだけでなく、保護者の方にもコンピュータを用意しています。</a:t>
-            </a:r>
-            <a:endParaRPr lang="en-US" altLang="ja-JP" sz="500" dirty="0" smtClean="0"/>
+            <a:endParaRPr lang="en-US" altLang="ja-JP" sz="700" dirty="0" smtClean="0"/>
           </a:p>
           <a:p>
             <a:pPr marL="0" indent="0">
@@ -5109,22 +5055,25 @@
               <a:spcBef>
                 <a:spcPts val="0"/>
               </a:spcBef>
-              <a:buFont typeface="Arial" panose="020B0604020202020204" pitchFamily="34" charset="0"/>
               <a:buNone/>
             </a:pPr>
             <a:r>
-              <a:rPr lang="ja-JP" altLang="en-US" sz="500" dirty="0" smtClean="0"/>
-              <a:t>初めての方や、コンピュータが苦手な方でも安心してください。マウスの操作だけで簡単なゲームを作ります。それを通じて、コンピュータのソフトウェアの作り方や、「</a:t>
-            </a:r>
-            <a:r>
-              <a:rPr lang="en-US" altLang="ja-JP" sz="500" dirty="0" smtClean="0"/>
-              <a:t>Ruby</a:t>
-            </a:r>
-            <a:r>
-              <a:rPr lang="ja-JP" altLang="en-US" sz="500" dirty="0" smtClean="0"/>
-              <a:t>」とはどういったものなのかを知っていただきます。</a:t>
-            </a:r>
-            <a:endParaRPr lang="en-US" altLang="ja-JP" sz="500" dirty="0"/>
+              <a:rPr lang="ja-JP" altLang="en-US" sz="800" dirty="0">
+                <a:latin typeface="+mj-ea"/>
+              </a:rPr>
+              <a:t>📌</a:t>
+            </a:r>
+            <a:r>
+              <a:rPr lang="ja-JP" altLang="en-US" sz="800" b="1" dirty="0" smtClean="0">
+                <a:latin typeface="+mj-ea"/>
+                <a:ea typeface="+mj-ea"/>
+              </a:rPr>
+              <a:t>当日</a:t>
+            </a:r>
+            <a:r>
+              <a:rPr lang="ja-JP" altLang="en-US" sz="800" b="1" dirty="0"/>
+              <a:t>の流れ</a:t>
+            </a:r>
           </a:p>
           <a:p>
             <a:pPr marL="0" indent="0">
@@ -5134,14 +5083,13 @@
               <a:spcBef>
                 <a:spcPts val="0"/>
               </a:spcBef>
-              <a:buFont typeface="Arial" panose="020B0604020202020204" pitchFamily="34" charset="0"/>
               <a:buNone/>
             </a:pPr>
             <a:r>
-              <a:rPr lang="ja-JP" altLang="en-US" sz="500" dirty="0" smtClean="0"/>
-              <a:t>なお、各回はすべて同じ内容ですのでご都合がいいときにご参加ください。</a:t>
-            </a:r>
-            <a:endParaRPr lang="en-US" altLang="ja-JP" sz="500" dirty="0" smtClean="0"/>
+              <a:rPr lang="ja-JP" altLang="en-US" sz="700" dirty="0"/>
+              <a:t>・受付</a:t>
+            </a:r>
+            <a:endParaRPr lang="en-US" altLang="ja-JP" sz="700" dirty="0"/>
           </a:p>
           <a:p>
             <a:pPr marL="0" indent="0">
@@ -5151,10 +5099,13 @@
               <a:spcBef>
                 <a:spcPts val="0"/>
               </a:spcBef>
-              <a:buFont typeface="Arial" panose="020B0604020202020204" pitchFamily="34" charset="0"/>
               <a:buNone/>
             </a:pPr>
-            <a:endParaRPr lang="en-US" altLang="ja-JP" sz="500" dirty="0"/>
+            <a:r>
+              <a:rPr lang="ja-JP" altLang="en-US" sz="700" dirty="0"/>
+              <a:t>・はじめに</a:t>
+            </a:r>
+            <a:endParaRPr lang="en-US" altLang="ja-JP" sz="700" dirty="0"/>
           </a:p>
           <a:p>
             <a:pPr marL="0" indent="0">
@@ -5164,10 +5115,13 @@
               <a:spcBef>
                 <a:spcPts val="0"/>
               </a:spcBef>
-              <a:buFont typeface="Arial" panose="020B0604020202020204" pitchFamily="34" charset="0"/>
               <a:buNone/>
             </a:pPr>
-            <a:endParaRPr lang="en-US" altLang="ja-JP" sz="500" dirty="0" smtClean="0"/>
+            <a:r>
+              <a:rPr lang="ja-JP" altLang="en-US" sz="700" dirty="0"/>
+              <a:t>・コンピュータの組み立て</a:t>
+            </a:r>
+            <a:endParaRPr lang="en-US" altLang="ja-JP" sz="700" dirty="0"/>
           </a:p>
           <a:p>
             <a:pPr marL="0" indent="0">
@@ -5180,16 +5134,18 @@
               <a:buNone/>
             </a:pPr>
             <a:r>
-              <a:rPr lang="ja-JP" altLang="en-US" sz="700" u="sng" dirty="0">
-                <a:latin typeface="+mj-ea"/>
-                <a:ea typeface="+mj-ea"/>
-              </a:rPr>
-              <a:t>当日</a:t>
-            </a:r>
-            <a:r>
-              <a:rPr lang="ja-JP" altLang="en-US" sz="700" u="sng" dirty="0"/>
-              <a:t>の流れ</a:t>
-            </a:r>
+              <a:rPr lang="ja-JP" altLang="en-US" sz="700" dirty="0"/>
+              <a:t>・プログラムや</a:t>
+            </a:r>
+            <a:r>
+              <a:rPr lang="en-US" altLang="ja-JP" sz="700" dirty="0"/>
+              <a:t>Ruby</a:t>
+            </a:r>
+            <a:r>
+              <a:rPr lang="ja-JP" altLang="en-US" sz="700" dirty="0"/>
+              <a:t>について学ぶ</a:t>
+            </a:r>
+            <a:endParaRPr lang="en-US" altLang="ja-JP" sz="700" dirty="0"/>
           </a:p>
           <a:p>
             <a:pPr marL="0" indent="0">
@@ -5202,10 +5158,10 @@
               <a:buNone/>
             </a:pPr>
             <a:r>
-              <a:rPr lang="ja-JP" altLang="en-US" sz="500" dirty="0"/>
-              <a:t>・受付</a:t>
-            </a:r>
-            <a:endParaRPr lang="en-US" altLang="ja-JP" sz="500" dirty="0"/>
+              <a:rPr lang="ja-JP" altLang="en-US" sz="700" dirty="0"/>
+              <a:t>・プログラムの作り方を学ぶ</a:t>
+            </a:r>
+            <a:endParaRPr lang="en-US" altLang="ja-JP" sz="700" dirty="0"/>
           </a:p>
           <a:p>
             <a:pPr marL="0" indent="0">
@@ -5218,10 +5174,10 @@
               <a:buNone/>
             </a:pPr>
             <a:r>
-              <a:rPr lang="ja-JP" altLang="en-US" sz="500" dirty="0"/>
-              <a:t>・はじめに</a:t>
-            </a:r>
-            <a:endParaRPr lang="en-US" altLang="ja-JP" sz="500" dirty="0"/>
+              <a:rPr lang="ja-JP" altLang="en-US" sz="700" dirty="0"/>
+              <a:t>・オリジナルのゲームを作る</a:t>
+            </a:r>
+            <a:endParaRPr lang="en-US" altLang="ja-JP" sz="700" dirty="0"/>
           </a:p>
           <a:p>
             <a:pPr marL="0" indent="0">
@@ -5234,10 +5190,10 @@
               <a:buNone/>
             </a:pPr>
             <a:r>
-              <a:rPr lang="ja-JP" altLang="en-US" sz="500" dirty="0"/>
-              <a:t>・コンピュータの組み立て</a:t>
-            </a:r>
-            <a:endParaRPr lang="en-US" altLang="ja-JP" sz="500" dirty="0"/>
+              <a:rPr lang="ja-JP" altLang="en-US" sz="700" dirty="0"/>
+              <a:t>・おわりに</a:t>
+            </a:r>
+            <a:endParaRPr lang="en-US" altLang="ja-JP" sz="700" dirty="0"/>
           </a:p>
           <a:p>
             <a:pPr marL="0" indent="0">
@@ -5250,18 +5206,14 @@
               <a:buNone/>
             </a:pPr>
             <a:r>
-              <a:rPr lang="ja-JP" altLang="en-US" sz="500" dirty="0"/>
-              <a:t>・プログラムや</a:t>
-            </a:r>
-            <a:r>
-              <a:rPr lang="en-US" altLang="ja-JP" sz="500" dirty="0"/>
-              <a:t>Ruby</a:t>
-            </a:r>
-            <a:r>
-              <a:rPr lang="ja-JP" altLang="en-US" sz="500" dirty="0"/>
-              <a:t>について学ぶ</a:t>
-            </a:r>
-            <a:endParaRPr lang="en-US" altLang="ja-JP" sz="500" dirty="0"/>
+              <a:rPr lang="ja-JP" altLang="en-US" sz="700" dirty="0"/>
+              <a:t>・</a:t>
+            </a:r>
+            <a:r>
+              <a:rPr lang="ja-JP" altLang="en-US" sz="700" dirty="0" smtClean="0"/>
+              <a:t>解散</a:t>
+            </a:r>
+            <a:endParaRPr lang="en-US" altLang="ja-JP" sz="700" dirty="0" smtClean="0"/>
           </a:p>
           <a:p>
             <a:pPr marL="0" indent="0">
@@ -5273,11 +5225,7 @@
               </a:spcBef>
               <a:buNone/>
             </a:pPr>
-            <a:r>
-              <a:rPr lang="ja-JP" altLang="en-US" sz="500" dirty="0"/>
-              <a:t>・プログラムの作り方を学ぶ</a:t>
-            </a:r>
-            <a:endParaRPr lang="en-US" altLang="ja-JP" sz="500" dirty="0"/>
+            <a:endParaRPr lang="en-US" altLang="ja-JP" sz="700" dirty="0"/>
           </a:p>
           <a:p>
             <a:pPr marL="0" indent="0">
@@ -5289,11 +5237,7 @@
               </a:spcBef>
               <a:buNone/>
             </a:pPr>
-            <a:r>
-              <a:rPr lang="ja-JP" altLang="en-US" sz="500" dirty="0"/>
-              <a:t>・オリジナルのゲームを作る</a:t>
-            </a:r>
-            <a:endParaRPr lang="en-US" altLang="ja-JP" sz="500" dirty="0"/>
+            <a:endParaRPr lang="en-US" altLang="ja-JP" sz="700" dirty="0"/>
           </a:p>
           <a:p>
             <a:pPr marL="0" indent="0">
@@ -5306,10 +5250,20 @@
               <a:buNone/>
             </a:pPr>
             <a:r>
-              <a:rPr lang="ja-JP" altLang="en-US" sz="500" dirty="0"/>
-              <a:t>・おわりに</a:t>
-            </a:r>
-            <a:endParaRPr lang="en-US" altLang="ja-JP" sz="500" dirty="0"/>
+              <a:rPr lang="ja-JP" altLang="en-US" sz="800" dirty="0">
+                <a:latin typeface="+mj-ea"/>
+              </a:rPr>
+              <a:t>📌</a:t>
+            </a:r>
+            <a:r>
+              <a:rPr lang="ja-JP" altLang="en-US" sz="800" b="1" dirty="0" smtClean="0">
+                <a:latin typeface="+mj-ea"/>
+              </a:rPr>
+              <a:t>開催予定</a:t>
+            </a:r>
+            <a:endParaRPr lang="en-US" altLang="ja-JP" sz="800" b="1" dirty="0" smtClean="0">
+              <a:latin typeface="+mj-ea"/>
+            </a:endParaRPr>
           </a:p>
           <a:p>
             <a:pPr marL="0" indent="0">
@@ -5321,11 +5275,7 @@
               </a:spcBef>
               <a:buNone/>
             </a:pPr>
-            <a:r>
-              <a:rPr lang="ja-JP" altLang="en-US" sz="500" dirty="0"/>
-              <a:t>・解散</a:t>
-            </a:r>
-            <a:endParaRPr lang="en-US" altLang="ja-JP" sz="500" dirty="0"/>
+            <a:endParaRPr lang="en-US" altLang="ja-JP" sz="700" dirty="0" smtClean="0"/>
           </a:p>
           <a:p>
             <a:pPr marL="0" indent="0">
@@ -5337,15 +5287,7 @@
               </a:spcBef>
               <a:buNone/>
             </a:pPr>
-            <a:r>
-              <a:rPr lang="ja-JP" altLang="en-US" sz="700" u="sng" dirty="0" smtClean="0">
-                <a:latin typeface="+mj-ea"/>
-              </a:rPr>
-              <a:t>開催予定</a:t>
-            </a:r>
-            <a:endParaRPr lang="en-US" altLang="ja-JP" sz="700" u="sng" dirty="0" smtClean="0">
-              <a:latin typeface="+mj-ea"/>
-            </a:endParaRPr>
+            <a:endParaRPr lang="en-US" altLang="ja-JP" sz="700" dirty="0"/>
           </a:p>
           <a:p>
             <a:pPr marL="0" indent="0">
@@ -5357,9 +5299,7 @@
               </a:spcBef>
               <a:buNone/>
             </a:pPr>
-            <a:endParaRPr lang="en-US" altLang="ja-JP" sz="500" dirty="0">
-              <a:latin typeface="+mj-ea"/>
-            </a:endParaRPr>
+            <a:endParaRPr lang="en-US" altLang="ja-JP" sz="700" dirty="0" smtClean="0"/>
           </a:p>
           <a:p>
             <a:pPr marL="0" indent="0">
@@ -5371,9 +5311,7 @@
               </a:spcBef>
               <a:buNone/>
             </a:pPr>
-            <a:endParaRPr lang="en-US" altLang="ja-JP" sz="500" dirty="0" smtClean="0">
-              <a:latin typeface="+mj-ea"/>
-            </a:endParaRPr>
+            <a:endParaRPr lang="en-US" altLang="ja-JP" sz="700" dirty="0"/>
           </a:p>
           <a:p>
             <a:pPr marL="0" indent="0">
@@ -5385,9 +5323,7 @@
               </a:spcBef>
               <a:buNone/>
             </a:pPr>
-            <a:endParaRPr lang="en-US" altLang="ja-JP" sz="500" dirty="0">
-              <a:latin typeface="+mj-ea"/>
-            </a:endParaRPr>
+            <a:endParaRPr lang="en-US" altLang="ja-JP" sz="700" dirty="0" smtClean="0"/>
           </a:p>
           <a:p>
             <a:pPr marL="0" indent="0">
@@ -5399,9 +5335,7 @@
               </a:spcBef>
               <a:buNone/>
             </a:pPr>
-            <a:endParaRPr lang="en-US" altLang="ja-JP" sz="500" dirty="0" smtClean="0">
-              <a:latin typeface="+mj-ea"/>
-            </a:endParaRPr>
+            <a:endParaRPr lang="en-US" altLang="ja-JP" sz="700" dirty="0"/>
           </a:p>
           <a:p>
             <a:pPr marL="0" indent="0">
@@ -5413,9 +5347,7 @@
               </a:spcBef>
               <a:buNone/>
             </a:pPr>
-            <a:endParaRPr lang="en-US" altLang="ja-JP" sz="500" dirty="0">
-              <a:latin typeface="+mj-ea"/>
-            </a:endParaRPr>
+            <a:endParaRPr lang="en-US" altLang="ja-JP" sz="700" dirty="0" smtClean="0"/>
           </a:p>
           <a:p>
             <a:pPr marL="0" indent="0">
@@ -5427,9 +5359,7 @@
               </a:spcBef>
               <a:buNone/>
             </a:pPr>
-            <a:endParaRPr lang="en-US" altLang="ja-JP" sz="500" dirty="0" smtClean="0">
-              <a:latin typeface="+mj-ea"/>
-            </a:endParaRPr>
+            <a:endParaRPr lang="en-US" altLang="ja-JP" sz="700" dirty="0"/>
           </a:p>
           <a:p>
             <a:pPr marL="0" indent="0">
@@ -5441,9 +5371,7 @@
               </a:spcBef>
               <a:buNone/>
             </a:pPr>
-            <a:endParaRPr lang="en-US" altLang="ja-JP" sz="500" dirty="0">
-              <a:latin typeface="+mj-ea"/>
-            </a:endParaRPr>
+            <a:endParaRPr lang="en-US" altLang="ja-JP" sz="700" dirty="0" smtClean="0"/>
           </a:p>
           <a:p>
             <a:pPr marL="0" indent="0">
@@ -5455,7 +5383,19 @@
               </a:spcBef>
               <a:buNone/>
             </a:pPr>
-            <a:endParaRPr lang="en-US" altLang="ja-JP" sz="500" dirty="0" smtClean="0">
+            <a:r>
+              <a:rPr lang="ja-JP" altLang="en-US" sz="700" dirty="0" smtClean="0"/>
+              <a:t>各回</a:t>
+            </a:r>
+            <a:r>
+              <a:rPr lang="ja-JP" altLang="en-US" sz="700" dirty="0"/>
+              <a:t>はすべて同じ内容ですのでご都合がいいときにご参加ください</a:t>
+            </a:r>
+            <a:r>
+              <a:rPr lang="ja-JP" altLang="en-US" sz="700" dirty="0" smtClean="0"/>
+              <a:t>。</a:t>
+            </a:r>
+            <a:endParaRPr lang="en-US" altLang="ja-JP" sz="600" dirty="0" smtClean="0">
               <a:latin typeface="+mj-ea"/>
             </a:endParaRPr>
           </a:p>
@@ -5469,65 +5409,23 @@
               </a:spcBef>
               <a:buNone/>
             </a:pPr>
-            <a:endParaRPr lang="en-US" altLang="ja-JP" sz="500" dirty="0">
-              <a:latin typeface="+mj-ea"/>
-            </a:endParaRPr>
-          </a:p>
-          <a:p>
-            <a:pPr marL="0" indent="0">
-              <a:lnSpc>
-                <a:spcPct val="150000"/>
-              </a:lnSpc>
-              <a:spcBef>
-                <a:spcPts val="0"/>
-              </a:spcBef>
-              <a:buNone/>
-            </a:pPr>
-            <a:endParaRPr lang="en-US" altLang="ja-JP" sz="500" dirty="0" smtClean="0">
-              <a:latin typeface="+mj-ea"/>
-            </a:endParaRPr>
-          </a:p>
-          <a:p>
-            <a:pPr marL="0" indent="0">
-              <a:lnSpc>
-                <a:spcPct val="150000"/>
-              </a:lnSpc>
-              <a:spcBef>
-                <a:spcPts val="0"/>
-              </a:spcBef>
-              <a:buNone/>
-            </a:pPr>
-            <a:endParaRPr lang="en-US" altLang="ja-JP" sz="500" dirty="0" smtClean="0">
-              <a:latin typeface="+mj-ea"/>
-            </a:endParaRPr>
-          </a:p>
-          <a:p>
-            <a:pPr marL="0" indent="0">
-              <a:lnSpc>
-                <a:spcPct val="150000"/>
-              </a:lnSpc>
-              <a:spcBef>
-                <a:spcPts val="0"/>
-              </a:spcBef>
-              <a:buNone/>
-            </a:pPr>
-            <a:r>
-              <a:rPr lang="ja-JP" altLang="en-US" sz="500" dirty="0"/>
+            <a:r>
+              <a:rPr lang="ja-JP" altLang="en-US" sz="700" dirty="0"/>
               <a:t>過去</a:t>
             </a:r>
             <a:r>
-              <a:rPr lang="ja-JP" altLang="en-US" sz="500" dirty="0" smtClean="0"/>
+              <a:rPr lang="ja-JP" altLang="en-US" sz="700" dirty="0" smtClean="0"/>
               <a:t>の体験イベントの様子はホームページ（</a:t>
             </a:r>
             <a:r>
-              <a:rPr lang="en-US" altLang="ja-JP" sz="500" dirty="0" smtClean="0"/>
+              <a:rPr lang="en-US" altLang="ja-JP" sz="700" dirty="0" smtClean="0"/>
               <a:t>http://smalruby.jp</a:t>
             </a:r>
             <a:r>
-              <a:rPr lang="ja-JP" altLang="en-US" sz="500" dirty="0" smtClean="0"/>
+              <a:rPr lang="ja-JP" altLang="en-US" sz="700" dirty="0" smtClean="0"/>
               <a:t>）からご覧いただけます。</a:t>
             </a:r>
-            <a:endParaRPr lang="en-US" altLang="ja-JP" sz="500" dirty="0">
+            <a:endParaRPr lang="en-US" altLang="ja-JP" sz="700" dirty="0">
               <a:latin typeface="+mj-ea"/>
             </a:endParaRPr>
           </a:p>
@@ -5575,14 +5473,14 @@
           <p:nvPr>
             <p:extLst>
               <p:ext uri="{D42A27DB-BD31-4B8C-83A1-F6EECF244321}">
-                <p14:modId xmlns:p14="http://schemas.microsoft.com/office/powerpoint/2010/main" val="1348390214"/>
+                <p14:modId xmlns:p14="http://schemas.microsoft.com/office/powerpoint/2010/main" val="2058514512"/>
               </p:ext>
             </p:extLst>
           </p:nvPr>
         </p:nvGraphicFramePr>
         <p:xfrm>
-          <a:off x="3612946" y="7383324"/>
-          <a:ext cx="1952302" cy="1226212"/>
+          <a:off x="4616951" y="6345708"/>
+          <a:ext cx="2057778" cy="1386840"/>
         </p:xfrm>
         <a:graphic>
           <a:graphicData uri="http://schemas.openxmlformats.org/drawingml/2006/table">
@@ -5591,8 +5489,8 @@
                 <a:tableStyleId>{7E9639D4-E3E2-4D34-9284-5A2195B3D0D7}</a:tableStyleId>
               </a:tblPr>
               <a:tblGrid>
-                <a:gridCol w="746711"/>
-                <a:gridCol w="1205591"/>
+                <a:gridCol w="787053"/>
+                <a:gridCol w="1270725"/>
               </a:tblGrid>
               <a:tr h="178428">
                 <a:tc>
@@ -5634,14 +5532,14 @@
                     <a:p>
                       <a:pPr algn="ctr"/>
                       <a:r>
-                        <a:rPr kumimoji="1" lang="ja-JP" altLang="en-US" sz="500" dirty="0" smtClean="0"/>
+                        <a:rPr kumimoji="1" lang="ja-JP" altLang="en-US" sz="700" dirty="0" smtClean="0"/>
                         <a:t>２月１５日</a:t>
                       </a:r>
                       <a:r>
-                        <a:rPr kumimoji="1" lang="ja-JP" altLang="en-US" sz="500" dirty="0" smtClean="0"/>
+                        <a:rPr kumimoji="1" lang="ja-JP" altLang="en-US" sz="700" dirty="0" smtClean="0"/>
                         <a:t>（日）</a:t>
                       </a:r>
-                      <a:endParaRPr kumimoji="1" lang="ja-JP" altLang="en-US" sz="500" dirty="0"/>
+                      <a:endParaRPr kumimoji="1" lang="ja-JP" altLang="en-US" sz="700" dirty="0"/>
                     </a:p>
                   </a:txBody>
                   <a:tcPr/>
@@ -5652,14 +5550,14 @@
                     <a:lstStyle/>
                     <a:p>
                       <a:r>
-                        <a:rPr kumimoji="1" lang="ja-JP" altLang="en-US" sz="500" dirty="0" smtClean="0"/>
+                        <a:rPr kumimoji="1" lang="ja-JP" altLang="en-US" sz="700" dirty="0" smtClean="0"/>
                         <a:t>松江市　</a:t>
                       </a:r>
                       <a:r>
-                        <a:rPr kumimoji="1" lang="ja-JP" altLang="en-US" sz="500" dirty="0" smtClean="0"/>
+                        <a:rPr kumimoji="1" lang="ja-JP" altLang="en-US" sz="700" dirty="0" smtClean="0"/>
                         <a:t>美保関公民館</a:t>
                       </a:r>
-                      <a:endParaRPr kumimoji="1" lang="en-US" altLang="ja-JP" sz="500" dirty="0" smtClean="0"/>
+                      <a:endParaRPr kumimoji="1" lang="en-US" altLang="ja-JP" sz="700" dirty="0" smtClean="0"/>
                     </a:p>
                   </a:txBody>
                   <a:tcPr/>
@@ -5673,10 +5571,10 @@
                     <a:p>
                       <a:pPr algn="ctr"/>
                       <a:r>
-                        <a:rPr kumimoji="1" lang="ja-JP" altLang="en-US" sz="500" dirty="0" smtClean="0"/>
+                        <a:rPr kumimoji="1" lang="ja-JP" altLang="en-US" sz="700" dirty="0" smtClean="0"/>
                         <a:t>３月１５日（日）</a:t>
                       </a:r>
-                      <a:endParaRPr kumimoji="1" lang="ja-JP" altLang="en-US" sz="500" dirty="0"/>
+                      <a:endParaRPr kumimoji="1" lang="ja-JP" altLang="en-US" sz="700" dirty="0"/>
                     </a:p>
                   </a:txBody>
                   <a:tcPr anchor="ctr"/>
@@ -5704,7 +5602,7 @@
                         <a:defRPr/>
                       </a:pPr>
                       <a:r>
-                        <a:rPr kumimoji="1" lang="ja-JP" altLang="en-US" sz="500" u="none" strike="noStrike" kern="1200" cap="none" spc="0" normalizeH="0" baseline="0" noProof="0" dirty="0" smtClean="0">
+                        <a:rPr kumimoji="1" lang="ja-JP" altLang="en-US" sz="700" u="none" strike="noStrike" kern="1200" cap="none" spc="0" normalizeH="0" baseline="0" noProof="0" dirty="0" smtClean="0">
                           <a:ln>
                             <a:noFill/>
                           </a:ln>
@@ -5714,7 +5612,7 @@
                         </a:rPr>
                         <a:t>未定（松江市東出雲町周辺）</a:t>
                       </a:r>
-                      <a:endParaRPr kumimoji="1" lang="en-US" altLang="ja-JP" sz="500" b="0" i="0" u="none" strike="noStrike" kern="1200" cap="none" spc="0" normalizeH="0" baseline="0" noProof="0" dirty="0" smtClean="0">
+                      <a:endParaRPr kumimoji="1" lang="en-US" altLang="ja-JP" sz="700" b="0" i="0" u="none" strike="noStrike" kern="1200" cap="none" spc="0" normalizeH="0" baseline="0" noProof="0" dirty="0" smtClean="0">
                         <a:ln>
                           <a:noFill/>
                         </a:ln>
@@ -5741,14 +5639,14 @@
                     <a:p>
                       <a:pPr algn="ctr"/>
                       <a:r>
-                        <a:rPr kumimoji="1" lang="ja-JP" altLang="en-US" sz="500" dirty="0" smtClean="0"/>
+                        <a:rPr kumimoji="1" lang="ja-JP" altLang="en-US" sz="700" dirty="0" smtClean="0"/>
                         <a:t>４月１９日</a:t>
                       </a:r>
                       <a:r>
-                        <a:rPr kumimoji="1" lang="ja-JP" altLang="en-US" sz="500" dirty="0" smtClean="0"/>
+                        <a:rPr kumimoji="1" lang="ja-JP" altLang="en-US" sz="700" dirty="0" smtClean="0"/>
                         <a:t>（日）</a:t>
                       </a:r>
-                      <a:endParaRPr kumimoji="1" lang="ja-JP" altLang="en-US" sz="500" dirty="0"/>
+                      <a:endParaRPr kumimoji="1" lang="ja-JP" altLang="en-US" sz="700" dirty="0"/>
                     </a:p>
                   </a:txBody>
                   <a:tcPr/>
@@ -5759,10 +5657,10 @@
                     <a:lstStyle/>
                     <a:p>
                       <a:r>
-                        <a:rPr kumimoji="1" lang="ja-JP" altLang="en-US" sz="500" dirty="0" smtClean="0"/>
+                        <a:rPr kumimoji="1" lang="ja-JP" altLang="en-US" sz="700" dirty="0" smtClean="0"/>
                         <a:t>未定（松江市宍道町周辺）</a:t>
                       </a:r>
-                      <a:endParaRPr kumimoji="1" lang="en-US" altLang="ja-JP" sz="500" dirty="0" smtClean="0"/>
+                      <a:endParaRPr kumimoji="1" lang="en-US" altLang="ja-JP" sz="700" dirty="0" smtClean="0"/>
                     </a:p>
                   </a:txBody>
                   <a:tcPr/>
@@ -5776,14 +5674,14 @@
                     <a:p>
                       <a:pPr algn="ctr"/>
                       <a:r>
-                        <a:rPr kumimoji="1" lang="ja-JP" altLang="en-US" sz="500" dirty="0" smtClean="0"/>
+                        <a:rPr kumimoji="1" lang="ja-JP" altLang="en-US" sz="700" dirty="0" smtClean="0"/>
                         <a:t>５月１７日</a:t>
                       </a:r>
                       <a:r>
-                        <a:rPr kumimoji="1" lang="ja-JP" altLang="en-US" sz="500" dirty="0" smtClean="0"/>
+                        <a:rPr kumimoji="1" lang="ja-JP" altLang="en-US" sz="700" dirty="0" smtClean="0"/>
                         <a:t>（日）</a:t>
                       </a:r>
-                      <a:endParaRPr kumimoji="1" lang="ja-JP" altLang="en-US" sz="500" dirty="0"/>
+                      <a:endParaRPr kumimoji="1" lang="ja-JP" altLang="en-US" sz="700" dirty="0"/>
                     </a:p>
                   </a:txBody>
                   <a:tcPr/>
@@ -5794,10 +5692,10 @@
                     <a:lstStyle/>
                     <a:p>
                       <a:r>
-                        <a:rPr kumimoji="1" lang="ja-JP" altLang="en-US" sz="500" dirty="0" smtClean="0"/>
+                        <a:rPr kumimoji="1" lang="ja-JP" altLang="en-US" sz="700" dirty="0" smtClean="0"/>
                         <a:t>未定（松江市）</a:t>
                       </a:r>
-                      <a:endParaRPr kumimoji="1" lang="en-US" altLang="ja-JP" sz="500" dirty="0" smtClean="0"/>
+                      <a:endParaRPr kumimoji="1" lang="en-US" altLang="ja-JP" sz="700" dirty="0" smtClean="0"/>
                     </a:p>
                   </a:txBody>
                   <a:tcPr/>
@@ -5811,14 +5709,14 @@
                     <a:p>
                       <a:pPr algn="ctr"/>
                       <a:r>
-                        <a:rPr kumimoji="1" lang="ja-JP" altLang="en-US" sz="500" dirty="0" smtClean="0"/>
+                        <a:rPr kumimoji="1" lang="ja-JP" altLang="en-US" sz="700" dirty="0" smtClean="0"/>
                         <a:t>６月２１日</a:t>
                       </a:r>
                       <a:r>
-                        <a:rPr kumimoji="1" lang="ja-JP" altLang="en-US" sz="500" dirty="0" smtClean="0"/>
+                        <a:rPr kumimoji="1" lang="ja-JP" altLang="en-US" sz="700" dirty="0" smtClean="0"/>
                         <a:t>（日）</a:t>
                       </a:r>
-                      <a:endParaRPr kumimoji="1" lang="ja-JP" altLang="en-US" sz="500" dirty="0"/>
+                      <a:endParaRPr kumimoji="1" lang="ja-JP" altLang="en-US" sz="700" dirty="0"/>
                     </a:p>
                   </a:txBody>
                   <a:tcPr/>
@@ -5846,10 +5744,10 @@
                         <a:defRPr/>
                       </a:pPr>
                       <a:r>
-                        <a:rPr kumimoji="1" lang="ja-JP" altLang="en-US" sz="500" dirty="0" smtClean="0"/>
+                        <a:rPr kumimoji="1" lang="ja-JP" altLang="en-US" sz="700" dirty="0" smtClean="0"/>
                         <a:t>未定（松江市）</a:t>
                       </a:r>
-                      <a:endParaRPr kumimoji="1" lang="en-US" altLang="ja-JP" sz="500" dirty="0" smtClean="0"/>
+                      <a:endParaRPr kumimoji="1" lang="en-US" altLang="ja-JP" sz="700" dirty="0" smtClean="0"/>
                     </a:p>
                   </a:txBody>
                   <a:tcPr/>
@@ -5863,10 +5761,10 @@
                     <a:p>
                       <a:pPr algn="ctr"/>
                       <a:r>
-                        <a:rPr kumimoji="1" lang="ja-JP" altLang="en-US" sz="500" dirty="0" smtClean="0"/>
+                        <a:rPr kumimoji="1" lang="ja-JP" altLang="en-US" sz="700" dirty="0" smtClean="0"/>
                         <a:t>７月１９日（日）</a:t>
                       </a:r>
-                      <a:endParaRPr kumimoji="1" lang="ja-JP" altLang="en-US" sz="500" dirty="0"/>
+                      <a:endParaRPr kumimoji="1" lang="ja-JP" altLang="en-US" sz="700" dirty="0"/>
                     </a:p>
                   </a:txBody>
                   <a:tcPr/>
@@ -5894,10 +5792,10 @@
                         <a:defRPr/>
                       </a:pPr>
                       <a:r>
-                        <a:rPr kumimoji="1" lang="ja-JP" altLang="en-US" sz="500" dirty="0" smtClean="0"/>
+                        <a:rPr kumimoji="1" lang="ja-JP" altLang="en-US" sz="700" dirty="0" smtClean="0"/>
                         <a:t>未定（松江市）</a:t>
                       </a:r>
-                      <a:endParaRPr kumimoji="1" lang="en-US" altLang="ja-JP" sz="500" dirty="0" smtClean="0"/>
+                      <a:endParaRPr kumimoji="1" lang="en-US" altLang="ja-JP" sz="700" dirty="0" smtClean="0"/>
                     </a:p>
                   </a:txBody>
                   <a:tcPr/>
@@ -5907,6 +5805,72 @@
           </a:graphicData>
         </a:graphic>
       </p:graphicFrame>
+      <p:cxnSp>
+        <p:nvCxnSpPr>
+          <p:cNvPr id="24" name="直線コネクタ 23"/>
+          <p:cNvCxnSpPr/>
+          <p:nvPr/>
+        </p:nvCxnSpPr>
+        <p:spPr>
+          <a:xfrm flipH="1">
+            <a:off x="2314725" y="6189070"/>
+            <a:ext cx="1218" cy="2675151"/>
+          </a:xfrm>
+          <a:prstGeom prst="line">
+            <a:avLst/>
+          </a:prstGeom>
+          <a:ln w="9525">
+            <a:prstDash val="sysDash"/>
+          </a:ln>
+        </p:spPr>
+        <p:style>
+          <a:lnRef idx="3">
+            <a:schemeClr val="dk1"/>
+          </a:lnRef>
+          <a:fillRef idx="0">
+            <a:schemeClr val="dk1"/>
+          </a:fillRef>
+          <a:effectRef idx="2">
+            <a:schemeClr val="dk1"/>
+          </a:effectRef>
+          <a:fontRef idx="minor">
+            <a:schemeClr val="tx1"/>
+          </a:fontRef>
+        </p:style>
+      </p:cxnSp>
+      <p:cxnSp>
+        <p:nvCxnSpPr>
+          <p:cNvPr id="27" name="直線コネクタ 26"/>
+          <p:cNvCxnSpPr/>
+          <p:nvPr/>
+        </p:nvCxnSpPr>
+        <p:spPr>
+          <a:xfrm flipH="1">
+            <a:off x="4511742" y="6189070"/>
+            <a:ext cx="1218" cy="2675151"/>
+          </a:xfrm>
+          <a:prstGeom prst="line">
+            <a:avLst/>
+          </a:prstGeom>
+          <a:ln w="9525">
+            <a:prstDash val="sysDash"/>
+          </a:ln>
+        </p:spPr>
+        <p:style>
+          <a:lnRef idx="3">
+            <a:schemeClr val="dk1"/>
+          </a:lnRef>
+          <a:fillRef idx="0">
+            <a:schemeClr val="dk1"/>
+          </a:fillRef>
+          <a:effectRef idx="2">
+            <a:schemeClr val="dk1"/>
+          </a:effectRef>
+          <a:fontRef idx="minor">
+            <a:schemeClr val="tx1"/>
+          </a:fontRef>
+        </p:style>
+      </p:cxnSp>
     </p:spTree>
     <p:extLst>
       <p:ext uri="{BB962C8B-B14F-4D97-AF65-F5344CB8AC3E}">

</xml_diff>